<commit_message>
Minor changes to slides for Paper 01
</commit_message>
<xml_diff>
--- a/Assignments/Townes_POLS6310_Spring2019_Paper01_slides.pptx
+++ b/Assignments/Townes_POLS6310_Spring2019_Paper01_slides.pptx
@@ -1961,7 +1961,11 @@
         <a:p>
           <a:r>
             <a:rPr lang="en-US" sz="1100" dirty="0" smtClean="0"/>
-            <a:t>Small business advocacy organizations</a:t>
+            <a:t>Leaders of small </a:t>
+          </a:r>
+          <a:r>
+            <a:rPr lang="en-US" sz="1100" dirty="0" smtClean="0"/>
+            <a:t>business advocacy organizations</a:t>
           </a:r>
           <a:endParaRPr lang="en-US" sz="1100" dirty="0"/>
         </a:p>
@@ -2757,11 +2761,7 @@
         <a:p>
           <a:r>
             <a:rPr lang="en-US" sz="1100" b="1" dirty="0" smtClean="0"/>
-            <a:t>This policy will unfairly take away opportunities from highly talented and deserving researchers </a:t>
-          </a:r>
-          <a:r>
-            <a:rPr lang="en-US" sz="1100" b="1" dirty="0" smtClean="0"/>
-            <a:t>.</a:t>
+            <a:t>This policy will unfairly take away opportunities from highly talented and deserving researchers .</a:t>
           </a:r>
           <a:endParaRPr lang="en-US" sz="1100" b="1" dirty="0"/>
         </a:p>
@@ -2871,35 +2871,7 @@
         <a:p>
           <a:r>
             <a:rPr lang="en-US" sz="1100" b="1" dirty="0" smtClean="0"/>
-            <a:t>This policy changes the selection </a:t>
-          </a:r>
-          <a:r>
-            <a:rPr lang="en-US" sz="1100" b="1" dirty="0" smtClean="0"/>
-            <a:t>criteria </a:t>
-          </a:r>
-          <a:r>
-            <a:rPr lang="en-US" sz="1100" b="1" dirty="0" smtClean="0"/>
-            <a:t>from </a:t>
-          </a:r>
-          <a:r>
-            <a:rPr lang="en-US" sz="1100" b="1" dirty="0" smtClean="0"/>
-            <a:t> </a:t>
-          </a:r>
-          <a:r>
-            <a:rPr lang="en-US" sz="1100" b="1" dirty="0" smtClean="0"/>
-            <a:t>research </a:t>
-          </a:r>
-          <a:r>
-            <a:rPr lang="en-US" sz="1100" b="1" dirty="0" smtClean="0"/>
-            <a:t>excellence </a:t>
-          </a:r>
-          <a:r>
-            <a:rPr lang="en-US" sz="1100" b="1" dirty="0" smtClean="0"/>
-            <a:t>to a </a:t>
-          </a:r>
-          <a:r>
-            <a:rPr lang="en-US" sz="1100" b="1" dirty="0" smtClean="0"/>
-            <a:t>criteria of privilege.</a:t>
+            <a:t>This policy changes the selection criteria from  research excellence to a criteria of privilege.</a:t>
           </a:r>
           <a:endParaRPr lang="en-US" sz="1100" b="1" dirty="0"/>
         </a:p>
@@ -3607,45 +3579,45 @@
     </dgm:pt>
   </dgm:ptLst>
   <dgm:cxnLst>
+    <dgm:cxn modelId="{B2124052-34AB-4435-8CBA-D34AF146A189}" type="presOf" srcId="{14D29AC4-9FA0-444D-8EE4-E85DEB5E57A2}" destId="{2874E84B-9605-494F-B813-85A702BFCF0F}" srcOrd="0" destOrd="2" presId="urn:microsoft.com/office/officeart/2011/layout/TabList"/>
+    <dgm:cxn modelId="{9139EE07-F69A-425D-9FD3-917AD48F4A26}" type="presOf" srcId="{FCB9211A-ECAF-4092-9AF3-4A80464FEEEF}" destId="{76F4CE38-89D0-4EAB-9E94-FD08C47879E4}" srcOrd="0" destOrd="0" presId="urn:microsoft.com/office/officeart/2011/layout/TabList"/>
+    <dgm:cxn modelId="{E50B4537-4222-4FA6-86D6-900B232A905B}" srcId="{84789903-61AF-4F8F-9430-490306DDBEA0}" destId="{DCB77698-D8A7-43AE-8C12-88D22546D4E0}" srcOrd="3" destOrd="0" parTransId="{0256383B-FBF2-49F0-935C-E17EB2C4D7C4}" sibTransId="{866D160B-DB4E-4FF6-BF8A-FD0216203DA1}"/>
+    <dgm:cxn modelId="{F1C43613-B926-4646-87FA-D992BF0A7796}" type="presOf" srcId="{8B2750EB-B434-41DC-A189-8424894B839C}" destId="{89B6103A-0012-428D-9057-99CB1F4B4519}" srcOrd="0" destOrd="0" presId="urn:microsoft.com/office/officeart/2011/layout/TabList"/>
+    <dgm:cxn modelId="{5B81B842-285D-4C21-BC2F-2555AB323F47}" srcId="{19EF64AF-D0D9-429E-86D3-4CE7A62D9930}" destId="{14D29AC4-9FA0-444D-8EE4-E85DEB5E57A2}" srcOrd="3" destOrd="0" parTransId="{8F845681-B05B-4E32-AD5D-21295FC02A07}" sibTransId="{EE9BAB10-D308-456A-ADB5-78C6FFFB97E6}"/>
+    <dgm:cxn modelId="{AD10BF23-1E69-4909-B6FA-24F65C0F2B83}" type="presOf" srcId="{28A4433D-892C-4392-A0C9-31AA297B23D1}" destId="{ABD9F4AA-584A-4C32-8AC6-1F842D5E3471}" srcOrd="0" destOrd="1" presId="urn:microsoft.com/office/officeart/2011/layout/TabList"/>
+    <dgm:cxn modelId="{E2B364F3-498C-4868-BFEB-56E8969D7655}" type="presOf" srcId="{EB3A3517-BC08-4AB8-AB32-CAA355AEBBAA}" destId="{2874E84B-9605-494F-B813-85A702BFCF0F}" srcOrd="0" destOrd="0" presId="urn:microsoft.com/office/officeart/2011/layout/TabList"/>
+    <dgm:cxn modelId="{96A20728-4B71-426D-8207-8D974A3F5B06}" srcId="{84789903-61AF-4F8F-9430-490306DDBEA0}" destId="{6B0EF60D-A0B1-46C5-9677-4BEA810977D2}" srcOrd="2" destOrd="0" parTransId="{DF3844A8-4E17-463F-BAAD-4ACB2C215D90}" sibTransId="{9DADB796-DA90-4478-BCA3-5929CA4ED0C6}"/>
+    <dgm:cxn modelId="{5F094A65-8D03-4DE2-90BC-845E0B1DF3F3}" srcId="{2F4105CE-F831-4489-A38E-EA308F965E1A}" destId="{8B2750EB-B434-41DC-A189-8424894B839C}" srcOrd="0" destOrd="0" parTransId="{FFC1F60D-411F-463B-80BE-8626FCEE6E20}" sibTransId="{1C68FAD9-F9C9-4D4A-9B81-2E6FECE526EB}"/>
+    <dgm:cxn modelId="{59C1BA7D-4D40-4BB3-8566-6C1139A98E64}" srcId="{19EF64AF-D0D9-429E-86D3-4CE7A62D9930}" destId="{6992769E-C929-46E1-B5DC-0D224D6E5340}" srcOrd="0" destOrd="0" parTransId="{37B9B495-CA51-4955-9418-9A2A7D83A101}" sibTransId="{025A960F-A828-4BA1-B49F-B19476EFF631}"/>
+    <dgm:cxn modelId="{0EB99273-E40B-4BA4-A24F-424DEB53EF5D}" type="presOf" srcId="{A990AE2A-665D-4A90-91E6-8CAE69B9C799}" destId="{ABD9F4AA-584A-4C32-8AC6-1F842D5E3471}" srcOrd="0" destOrd="0" presId="urn:microsoft.com/office/officeart/2011/layout/TabList"/>
+    <dgm:cxn modelId="{EC26D4FA-8D0A-4965-860E-E576DA3FE7C2}" srcId="{84789903-61AF-4F8F-9430-490306DDBEA0}" destId="{2F4105CE-F831-4489-A38E-EA308F965E1A}" srcOrd="1" destOrd="0" parTransId="{B2367E5B-DF6B-423A-8C73-6C51AA905F42}" sibTransId="{42FAF69B-DD6C-4C4C-A008-7959F807FCD6}"/>
+    <dgm:cxn modelId="{3F79F1C5-5A6B-4B5D-ABE8-486E8727C12D}" type="presOf" srcId="{48BF764E-F495-4A56-AE96-47376DC45472}" destId="{F2E5F12B-CEBA-404F-BC59-D0A75B115C1F}" srcOrd="0" destOrd="2" presId="urn:microsoft.com/office/officeart/2011/layout/TabList"/>
+    <dgm:cxn modelId="{08D37855-A906-4ED9-B03D-BFDBE60EF8C7}" srcId="{6B0EF60D-A0B1-46C5-9677-4BEA810977D2}" destId="{FCB9211A-ECAF-4092-9AF3-4A80464FEEEF}" srcOrd="0" destOrd="0" parTransId="{96E2E2CF-28EB-47BD-B8D8-43FB5B4BBC76}" sibTransId="{80A46D5D-E138-4619-973A-52836DB4B626}"/>
+    <dgm:cxn modelId="{6546E246-748E-4D89-8B27-C6C10AA3AC70}" type="presOf" srcId="{ADA4DD4E-A13B-4B3A-BF0B-6A9868DD9270}" destId="{269C0782-BA35-4C3A-B295-D76ACD031E2B}" srcOrd="0" destOrd="1" presId="urn:microsoft.com/office/officeart/2011/layout/TabList"/>
+    <dgm:cxn modelId="{A993A3EF-AF47-4DBB-90D8-CF06FBF70E61}" srcId="{19EF64AF-D0D9-429E-86D3-4CE7A62D9930}" destId="{D4A5DE5E-27AD-4B23-B1EC-53CFB1739A11}" srcOrd="2" destOrd="0" parTransId="{C42F195C-72E6-4357-8789-A7DF85FC0BFF}" sibTransId="{D861C33F-DAAB-4018-91B9-D602CB0B9349}"/>
+    <dgm:cxn modelId="{2367FF4F-D248-4F58-A0D9-784D3549B7D2}" type="presOf" srcId="{F6CCDE68-20A3-48C9-9929-36D9326E50C7}" destId="{269C0782-BA35-4C3A-B295-D76ACD031E2B}" srcOrd="0" destOrd="0" presId="urn:microsoft.com/office/officeart/2011/layout/TabList"/>
+    <dgm:cxn modelId="{42EE89B5-C132-45F6-89DF-FAA355D8AB66}" type="presOf" srcId="{84789903-61AF-4F8F-9430-490306DDBEA0}" destId="{8937854E-C94A-470E-AB4D-2D1BF4D6EC0A}" srcOrd="0" destOrd="0" presId="urn:microsoft.com/office/officeart/2011/layout/TabList"/>
+    <dgm:cxn modelId="{BC8D3C2F-C842-4AEF-9163-91FCF0A63C32}" srcId="{84789903-61AF-4F8F-9430-490306DDBEA0}" destId="{19EF64AF-D0D9-429E-86D3-4CE7A62D9930}" srcOrd="0" destOrd="0" parTransId="{65F72764-603C-4BEA-9757-C2D922CDE6E7}" sibTransId="{A59A006A-971D-4A33-AB31-4CEE6264B4C5}"/>
+    <dgm:cxn modelId="{0536D819-2399-475C-9A09-D2166C361830}" type="presOf" srcId="{03E9865A-20D2-4CF6-AA88-EF74E4A16F4A}" destId="{F2E5F12B-CEBA-404F-BC59-D0A75B115C1F}" srcOrd="0" destOrd="1" presId="urn:microsoft.com/office/officeart/2011/layout/TabList"/>
+    <dgm:cxn modelId="{D1EABC93-08A9-4A6F-84B0-B428BA9969D7}" type="presOf" srcId="{D4A5DE5E-27AD-4B23-B1EC-53CFB1739A11}" destId="{2874E84B-9605-494F-B813-85A702BFCF0F}" srcOrd="0" destOrd="1" presId="urn:microsoft.com/office/officeart/2011/layout/TabList"/>
+    <dgm:cxn modelId="{C33B3223-996C-4204-9B9A-61F80D001862}" srcId="{6B0EF60D-A0B1-46C5-9677-4BEA810977D2}" destId="{48BF764E-F495-4A56-AE96-47376DC45472}" srcOrd="3" destOrd="0" parTransId="{CED2C589-1478-4EE9-8864-36B6C00D583D}" sibTransId="{D6B20742-473A-4B9F-A0CC-85E95BE0720F}"/>
+    <dgm:cxn modelId="{9C741026-5DFA-48E0-BCB8-618D95B45615}" srcId="{2F4105CE-F831-4489-A38E-EA308F965E1A}" destId="{28A4433D-892C-4392-A0C9-31AA297B23D1}" srcOrd="2" destOrd="0" parTransId="{38F9BBF9-BEAA-4EF2-A10C-767F24A70094}" sibTransId="{FF662DDE-5536-4F81-B4BD-F479E8E272D8}"/>
+    <dgm:cxn modelId="{FB51F38E-5F9F-4D3E-BF90-82BB4C1D2DB9}" type="presOf" srcId="{6992769E-C929-46E1-B5DC-0D224D6E5340}" destId="{F82F5449-D542-4810-B467-43A5C2614DD5}" srcOrd="0" destOrd="0" presId="urn:microsoft.com/office/officeart/2011/layout/TabList"/>
+    <dgm:cxn modelId="{9E0BBC12-F01A-46AF-A765-697A5062C11D}" type="presOf" srcId="{54C77FC2-06D5-494F-88FF-639A9A2ADF2B}" destId="{BDDE8257-E413-4550-9DF4-ACE5D4DAF407}" srcOrd="0" destOrd="0" presId="urn:microsoft.com/office/officeart/2011/layout/TabList"/>
+    <dgm:cxn modelId="{272F4F47-B6F0-44E6-BE53-1E568010F73F}" srcId="{6B0EF60D-A0B1-46C5-9677-4BEA810977D2}" destId="{432382F3-03DD-4963-A6A5-C32D1C07F990}" srcOrd="1" destOrd="0" parTransId="{428261C4-B743-4CC1-8298-2B59764B7274}" sibTransId="{19522E25-3C1D-4596-9D61-BE8AA7854562}"/>
+    <dgm:cxn modelId="{2657FA28-A895-46D4-90D1-07F9A903CBBC}" srcId="{19EF64AF-D0D9-429E-86D3-4CE7A62D9930}" destId="{EB3A3517-BC08-4AB8-AB32-CAA355AEBBAA}" srcOrd="1" destOrd="0" parTransId="{B734E8AD-9F0E-4587-9C1F-9483C3D89D69}" sibTransId="{6388FC91-51F0-4583-AFC8-08BE7A667D2D}"/>
+    <dgm:cxn modelId="{6AEA36B3-723E-4C26-991B-32293EC4977D}" srcId="{DCB77698-D8A7-43AE-8C12-88D22546D4E0}" destId="{F6CCDE68-20A3-48C9-9929-36D9326E50C7}" srcOrd="1" destOrd="0" parTransId="{6D777BDB-A14B-4CB9-848E-609F2B89797D}" sibTransId="{E73E6EC1-A77B-4806-AF59-F300788A17A6}"/>
+    <dgm:cxn modelId="{6FBD327E-F3DD-4D5F-892E-365E295EB833}" type="presOf" srcId="{DCB77698-D8A7-43AE-8C12-88D22546D4E0}" destId="{9059B661-BA02-491A-9141-4597C2088440}" srcOrd="0" destOrd="0" presId="urn:microsoft.com/office/officeart/2011/layout/TabList"/>
+    <dgm:cxn modelId="{576B1C0C-BC74-4AB0-84AC-D638255D8C52}" srcId="{2F4105CE-F831-4489-A38E-EA308F965E1A}" destId="{E2EDF958-A636-4721-91E2-1009161BE1BC}" srcOrd="3" destOrd="0" parTransId="{56017F76-3EE4-4B10-980E-2962F4DDFEEC}" sibTransId="{D4D47A36-D2AE-41C2-A545-1538EA1F1179}"/>
     <dgm:cxn modelId="{3DB12D0E-B496-47AC-B9D8-B8B2B6369FEF}" srcId="{6B0EF60D-A0B1-46C5-9677-4BEA810977D2}" destId="{03E9865A-20D2-4CF6-AA88-EF74E4A16F4A}" srcOrd="2" destOrd="0" parTransId="{8248E5BD-5697-4B1E-BCB4-ABC0B2D8E72E}" sibTransId="{EEBE7D8C-BEE1-4AE3-A6A1-B72D470C50D8}"/>
-    <dgm:cxn modelId="{A993A3EF-AF47-4DBB-90D8-CF06FBF70E61}" srcId="{19EF64AF-D0D9-429E-86D3-4CE7A62D9930}" destId="{D4A5DE5E-27AD-4B23-B1EC-53CFB1739A11}" srcOrd="2" destOrd="0" parTransId="{C42F195C-72E6-4357-8789-A7DF85FC0BFF}" sibTransId="{D861C33F-DAAB-4018-91B9-D602CB0B9349}"/>
-    <dgm:cxn modelId="{BC8D3C2F-C842-4AEF-9163-91FCF0A63C32}" srcId="{84789903-61AF-4F8F-9430-490306DDBEA0}" destId="{19EF64AF-D0D9-429E-86D3-4CE7A62D9930}" srcOrd="0" destOrd="0" parTransId="{65F72764-603C-4BEA-9757-C2D922CDE6E7}" sibTransId="{A59A006A-971D-4A33-AB31-4CEE6264B4C5}"/>
-    <dgm:cxn modelId="{E2B364F3-498C-4868-BFEB-56E8969D7655}" type="presOf" srcId="{EB3A3517-BC08-4AB8-AB32-CAA355AEBBAA}" destId="{2874E84B-9605-494F-B813-85A702BFCF0F}" srcOrd="0" destOrd="0" presId="urn:microsoft.com/office/officeart/2011/layout/TabList"/>
-    <dgm:cxn modelId="{9139EE07-F69A-425D-9FD3-917AD48F4A26}" type="presOf" srcId="{FCB9211A-ECAF-4092-9AF3-4A80464FEEEF}" destId="{76F4CE38-89D0-4EAB-9E94-FD08C47879E4}" srcOrd="0" destOrd="0" presId="urn:microsoft.com/office/officeart/2011/layout/TabList"/>
-    <dgm:cxn modelId="{42EE89B5-C132-45F6-89DF-FAA355D8AB66}" type="presOf" srcId="{84789903-61AF-4F8F-9430-490306DDBEA0}" destId="{8937854E-C94A-470E-AB4D-2D1BF4D6EC0A}" srcOrd="0" destOrd="0" presId="urn:microsoft.com/office/officeart/2011/layout/TabList"/>
-    <dgm:cxn modelId="{0536D819-2399-475C-9A09-D2166C361830}" type="presOf" srcId="{03E9865A-20D2-4CF6-AA88-EF74E4A16F4A}" destId="{F2E5F12B-CEBA-404F-BC59-D0A75B115C1F}" srcOrd="0" destOrd="1" presId="urn:microsoft.com/office/officeart/2011/layout/TabList"/>
+    <dgm:cxn modelId="{A9F942E9-1197-421A-8955-236A83F08879}" type="presOf" srcId="{6B0EF60D-A0B1-46C5-9677-4BEA810977D2}" destId="{79569B4D-C26F-4F14-9A58-54D0240E4532}" srcOrd="0" destOrd="0" presId="urn:microsoft.com/office/officeart/2011/layout/TabList"/>
+    <dgm:cxn modelId="{2896DAC6-E607-42B4-9D8E-740D71F49BEA}" srcId="{DCB77698-D8A7-43AE-8C12-88D22546D4E0}" destId="{54C77FC2-06D5-494F-88FF-639A9A2ADF2B}" srcOrd="0" destOrd="0" parTransId="{59058AE7-0BCA-42FD-8DA7-9E303C2F3598}" sibTransId="{DD5B0AF5-4F1F-4F54-9327-3F9C5FD2ADF5}"/>
     <dgm:cxn modelId="{64A82602-28B8-46E2-8A9C-588C292914B6}" type="presOf" srcId="{2F4105CE-F831-4489-A38E-EA308F965E1A}" destId="{8DF5D93B-DC31-4D2E-91E9-BD58313DDF36}" srcOrd="0" destOrd="0" presId="urn:microsoft.com/office/officeart/2011/layout/TabList"/>
-    <dgm:cxn modelId="{B2124052-34AB-4435-8CBA-D34AF146A189}" type="presOf" srcId="{14D29AC4-9FA0-444D-8EE4-E85DEB5E57A2}" destId="{2874E84B-9605-494F-B813-85A702BFCF0F}" srcOrd="0" destOrd="2" presId="urn:microsoft.com/office/officeart/2011/layout/TabList"/>
-    <dgm:cxn modelId="{F1C43613-B926-4646-87FA-D992BF0A7796}" type="presOf" srcId="{8B2750EB-B434-41DC-A189-8424894B839C}" destId="{89B6103A-0012-428D-9057-99CB1F4B4519}" srcOrd="0" destOrd="0" presId="urn:microsoft.com/office/officeart/2011/layout/TabList"/>
-    <dgm:cxn modelId="{3F79F1C5-5A6B-4B5D-ABE8-486E8727C12D}" type="presOf" srcId="{48BF764E-F495-4A56-AE96-47376DC45472}" destId="{F2E5F12B-CEBA-404F-BC59-D0A75B115C1F}" srcOrd="0" destOrd="2" presId="urn:microsoft.com/office/officeart/2011/layout/TabList"/>
-    <dgm:cxn modelId="{6546E246-748E-4D89-8B27-C6C10AA3AC70}" type="presOf" srcId="{ADA4DD4E-A13B-4B3A-BF0B-6A9868DD9270}" destId="{269C0782-BA35-4C3A-B295-D76ACD031E2B}" srcOrd="0" destOrd="1" presId="urn:microsoft.com/office/officeart/2011/layout/TabList"/>
+    <dgm:cxn modelId="{EA29C83E-1DCA-4FBB-975D-0E40E46D2194}" type="presOf" srcId="{432382F3-03DD-4963-A6A5-C32D1C07F990}" destId="{F2E5F12B-CEBA-404F-BC59-D0A75B115C1F}" srcOrd="0" destOrd="0" presId="urn:microsoft.com/office/officeart/2011/layout/TabList"/>
+    <dgm:cxn modelId="{C40B86E0-D802-4C2B-9B30-FF087E46B20A}" srcId="{2F4105CE-F831-4489-A38E-EA308F965E1A}" destId="{A990AE2A-665D-4A90-91E6-8CAE69B9C799}" srcOrd="1" destOrd="0" parTransId="{C4D8ABC1-84E3-45E5-AE1D-9D540D360E76}" sibTransId="{6B7AAB65-DFF8-472A-BB24-DFEC163070BA}"/>
+    <dgm:cxn modelId="{C53AA40F-C7B5-48B1-9833-6AADD820240F}" srcId="{DCB77698-D8A7-43AE-8C12-88D22546D4E0}" destId="{ADA4DD4E-A13B-4B3A-BF0B-6A9868DD9270}" srcOrd="2" destOrd="0" parTransId="{A69BEB30-D4D0-4373-A980-FBE1B2210F40}" sibTransId="{31FC63FF-B7FD-42AA-95A2-FED2E149343F}"/>
+    <dgm:cxn modelId="{D9904F38-9A5D-48F4-991F-91A4A57053FD}" type="presOf" srcId="{19EF64AF-D0D9-429E-86D3-4CE7A62D9930}" destId="{B06197F1-B041-4747-A702-99E72A52C66D}" srcOrd="0" destOrd="0" presId="urn:microsoft.com/office/officeart/2011/layout/TabList"/>
     <dgm:cxn modelId="{4AEC2818-9C22-4CEF-8878-5915FF4711B6}" type="presOf" srcId="{E2EDF958-A636-4721-91E2-1009161BE1BC}" destId="{ABD9F4AA-584A-4C32-8AC6-1F842D5E3471}" srcOrd="0" destOrd="2" presId="urn:microsoft.com/office/officeart/2011/layout/TabList"/>
-    <dgm:cxn modelId="{D9904F38-9A5D-48F4-991F-91A4A57053FD}" type="presOf" srcId="{19EF64AF-D0D9-429E-86D3-4CE7A62D9930}" destId="{B06197F1-B041-4747-A702-99E72A52C66D}" srcOrd="0" destOrd="0" presId="urn:microsoft.com/office/officeart/2011/layout/TabList"/>
-    <dgm:cxn modelId="{2896DAC6-E607-42B4-9D8E-740D71F49BEA}" srcId="{DCB77698-D8A7-43AE-8C12-88D22546D4E0}" destId="{54C77FC2-06D5-494F-88FF-639A9A2ADF2B}" srcOrd="0" destOrd="0" parTransId="{59058AE7-0BCA-42FD-8DA7-9E303C2F3598}" sibTransId="{DD5B0AF5-4F1F-4F54-9327-3F9C5FD2ADF5}"/>
-    <dgm:cxn modelId="{D1EABC93-08A9-4A6F-84B0-B428BA9969D7}" type="presOf" srcId="{D4A5DE5E-27AD-4B23-B1EC-53CFB1739A11}" destId="{2874E84B-9605-494F-B813-85A702BFCF0F}" srcOrd="0" destOrd="1" presId="urn:microsoft.com/office/officeart/2011/layout/TabList"/>
-    <dgm:cxn modelId="{5F094A65-8D03-4DE2-90BC-845E0B1DF3F3}" srcId="{2F4105CE-F831-4489-A38E-EA308F965E1A}" destId="{8B2750EB-B434-41DC-A189-8424894B839C}" srcOrd="0" destOrd="0" parTransId="{FFC1F60D-411F-463B-80BE-8626FCEE6E20}" sibTransId="{1C68FAD9-F9C9-4D4A-9B81-2E6FECE526EB}"/>
-    <dgm:cxn modelId="{576B1C0C-BC74-4AB0-84AC-D638255D8C52}" srcId="{2F4105CE-F831-4489-A38E-EA308F965E1A}" destId="{E2EDF958-A636-4721-91E2-1009161BE1BC}" srcOrd="3" destOrd="0" parTransId="{56017F76-3EE4-4B10-980E-2962F4DDFEEC}" sibTransId="{D4D47A36-D2AE-41C2-A545-1538EA1F1179}"/>
-    <dgm:cxn modelId="{5B81B842-285D-4C21-BC2F-2555AB323F47}" srcId="{19EF64AF-D0D9-429E-86D3-4CE7A62D9930}" destId="{14D29AC4-9FA0-444D-8EE4-E85DEB5E57A2}" srcOrd="3" destOrd="0" parTransId="{8F845681-B05B-4E32-AD5D-21295FC02A07}" sibTransId="{EE9BAB10-D308-456A-ADB5-78C6FFFB97E6}"/>
-    <dgm:cxn modelId="{2657FA28-A895-46D4-90D1-07F9A903CBBC}" srcId="{19EF64AF-D0D9-429E-86D3-4CE7A62D9930}" destId="{EB3A3517-BC08-4AB8-AB32-CAA355AEBBAA}" srcOrd="1" destOrd="0" parTransId="{B734E8AD-9F0E-4587-9C1F-9483C3D89D69}" sibTransId="{6388FC91-51F0-4583-AFC8-08BE7A667D2D}"/>
-    <dgm:cxn modelId="{0EB99273-E40B-4BA4-A24F-424DEB53EF5D}" type="presOf" srcId="{A990AE2A-665D-4A90-91E6-8CAE69B9C799}" destId="{ABD9F4AA-584A-4C32-8AC6-1F842D5E3471}" srcOrd="0" destOrd="0" presId="urn:microsoft.com/office/officeart/2011/layout/TabList"/>
-    <dgm:cxn modelId="{59C1BA7D-4D40-4BB3-8566-6C1139A98E64}" srcId="{19EF64AF-D0D9-429E-86D3-4CE7A62D9930}" destId="{6992769E-C929-46E1-B5DC-0D224D6E5340}" srcOrd="0" destOrd="0" parTransId="{37B9B495-CA51-4955-9418-9A2A7D83A101}" sibTransId="{025A960F-A828-4BA1-B49F-B19476EFF631}"/>
-    <dgm:cxn modelId="{C33B3223-996C-4204-9B9A-61F80D001862}" srcId="{6B0EF60D-A0B1-46C5-9677-4BEA810977D2}" destId="{48BF764E-F495-4A56-AE96-47376DC45472}" srcOrd="3" destOrd="0" parTransId="{CED2C589-1478-4EE9-8864-36B6C00D583D}" sibTransId="{D6B20742-473A-4B9F-A0CC-85E95BE0720F}"/>
-    <dgm:cxn modelId="{C40B86E0-D802-4C2B-9B30-FF087E46B20A}" srcId="{2F4105CE-F831-4489-A38E-EA308F965E1A}" destId="{A990AE2A-665D-4A90-91E6-8CAE69B9C799}" srcOrd="1" destOrd="0" parTransId="{C4D8ABC1-84E3-45E5-AE1D-9D540D360E76}" sibTransId="{6B7AAB65-DFF8-472A-BB24-DFEC163070BA}"/>
-    <dgm:cxn modelId="{6FBD327E-F3DD-4D5F-892E-365E295EB833}" type="presOf" srcId="{DCB77698-D8A7-43AE-8C12-88D22546D4E0}" destId="{9059B661-BA02-491A-9141-4597C2088440}" srcOrd="0" destOrd="0" presId="urn:microsoft.com/office/officeart/2011/layout/TabList"/>
-    <dgm:cxn modelId="{A9F942E9-1197-421A-8955-236A83F08879}" type="presOf" srcId="{6B0EF60D-A0B1-46C5-9677-4BEA810977D2}" destId="{79569B4D-C26F-4F14-9A58-54D0240E4532}" srcOrd="0" destOrd="0" presId="urn:microsoft.com/office/officeart/2011/layout/TabList"/>
-    <dgm:cxn modelId="{9E0BBC12-F01A-46AF-A765-697A5062C11D}" type="presOf" srcId="{54C77FC2-06D5-494F-88FF-639A9A2ADF2B}" destId="{BDDE8257-E413-4550-9DF4-ACE5D4DAF407}" srcOrd="0" destOrd="0" presId="urn:microsoft.com/office/officeart/2011/layout/TabList"/>
-    <dgm:cxn modelId="{08D37855-A906-4ED9-B03D-BFDBE60EF8C7}" srcId="{6B0EF60D-A0B1-46C5-9677-4BEA810977D2}" destId="{FCB9211A-ECAF-4092-9AF3-4A80464FEEEF}" srcOrd="0" destOrd="0" parTransId="{96E2E2CF-28EB-47BD-B8D8-43FB5B4BBC76}" sibTransId="{80A46D5D-E138-4619-973A-52836DB4B626}"/>
-    <dgm:cxn modelId="{272F4F47-B6F0-44E6-BE53-1E568010F73F}" srcId="{6B0EF60D-A0B1-46C5-9677-4BEA810977D2}" destId="{432382F3-03DD-4963-A6A5-C32D1C07F990}" srcOrd="1" destOrd="0" parTransId="{428261C4-B743-4CC1-8298-2B59764B7274}" sibTransId="{19522E25-3C1D-4596-9D61-BE8AA7854562}"/>
-    <dgm:cxn modelId="{6AEA36B3-723E-4C26-991B-32293EC4977D}" srcId="{DCB77698-D8A7-43AE-8C12-88D22546D4E0}" destId="{F6CCDE68-20A3-48C9-9929-36D9326E50C7}" srcOrd="1" destOrd="0" parTransId="{6D777BDB-A14B-4CB9-848E-609F2B89797D}" sibTransId="{E73E6EC1-A77B-4806-AF59-F300788A17A6}"/>
-    <dgm:cxn modelId="{9C741026-5DFA-48E0-BCB8-618D95B45615}" srcId="{2F4105CE-F831-4489-A38E-EA308F965E1A}" destId="{28A4433D-892C-4392-A0C9-31AA297B23D1}" srcOrd="2" destOrd="0" parTransId="{38F9BBF9-BEAA-4EF2-A10C-767F24A70094}" sibTransId="{FF662DDE-5536-4F81-B4BD-F479E8E272D8}"/>
-    <dgm:cxn modelId="{C53AA40F-C7B5-48B1-9833-6AADD820240F}" srcId="{DCB77698-D8A7-43AE-8C12-88D22546D4E0}" destId="{ADA4DD4E-A13B-4B3A-BF0B-6A9868DD9270}" srcOrd="2" destOrd="0" parTransId="{A69BEB30-D4D0-4373-A980-FBE1B2210F40}" sibTransId="{31FC63FF-B7FD-42AA-95A2-FED2E149343F}"/>
-    <dgm:cxn modelId="{EA29C83E-1DCA-4FBB-975D-0E40E46D2194}" type="presOf" srcId="{432382F3-03DD-4963-A6A5-C32D1C07F990}" destId="{F2E5F12B-CEBA-404F-BC59-D0A75B115C1F}" srcOrd="0" destOrd="0" presId="urn:microsoft.com/office/officeart/2011/layout/TabList"/>
-    <dgm:cxn modelId="{2367FF4F-D248-4F58-A0D9-784D3549B7D2}" type="presOf" srcId="{F6CCDE68-20A3-48C9-9929-36D9326E50C7}" destId="{269C0782-BA35-4C3A-B295-D76ACD031E2B}" srcOrd="0" destOrd="0" presId="urn:microsoft.com/office/officeart/2011/layout/TabList"/>
-    <dgm:cxn modelId="{AD10BF23-1E69-4909-B6FA-24F65C0F2B83}" type="presOf" srcId="{28A4433D-892C-4392-A0C9-31AA297B23D1}" destId="{ABD9F4AA-584A-4C32-8AC6-1F842D5E3471}" srcOrd="0" destOrd="1" presId="urn:microsoft.com/office/officeart/2011/layout/TabList"/>
-    <dgm:cxn modelId="{96A20728-4B71-426D-8207-8D974A3F5B06}" srcId="{84789903-61AF-4F8F-9430-490306DDBEA0}" destId="{6B0EF60D-A0B1-46C5-9677-4BEA810977D2}" srcOrd="2" destOrd="0" parTransId="{DF3844A8-4E17-463F-BAAD-4ACB2C215D90}" sibTransId="{9DADB796-DA90-4478-BCA3-5929CA4ED0C6}"/>
-    <dgm:cxn modelId="{FB51F38E-5F9F-4D3E-BF90-82BB4C1D2DB9}" type="presOf" srcId="{6992769E-C929-46E1-B5DC-0D224D6E5340}" destId="{F82F5449-D542-4810-B467-43A5C2614DD5}" srcOrd="0" destOrd="0" presId="urn:microsoft.com/office/officeart/2011/layout/TabList"/>
-    <dgm:cxn modelId="{E50B4537-4222-4FA6-86D6-900B232A905B}" srcId="{84789903-61AF-4F8F-9430-490306DDBEA0}" destId="{DCB77698-D8A7-43AE-8C12-88D22546D4E0}" srcOrd="3" destOrd="0" parTransId="{0256383B-FBF2-49F0-935C-E17EB2C4D7C4}" sibTransId="{866D160B-DB4E-4FF6-BF8A-FD0216203DA1}"/>
-    <dgm:cxn modelId="{EC26D4FA-8D0A-4965-860E-E576DA3FE7C2}" srcId="{84789903-61AF-4F8F-9430-490306DDBEA0}" destId="{2F4105CE-F831-4489-A38E-EA308F965E1A}" srcOrd="1" destOrd="0" parTransId="{B2367E5B-DF6B-423A-8C73-6C51AA905F42}" sibTransId="{42FAF69B-DD6C-4C4C-A008-7959F807FCD6}"/>
     <dgm:cxn modelId="{2F47F51D-5D99-460D-A41A-7BA1B38FCB61}" type="presParOf" srcId="{8937854E-C94A-470E-AB4D-2D1BF4D6EC0A}" destId="{63CF07DF-294E-4215-9B6C-5C3BCCC45688}" srcOrd="0" destOrd="0" presId="urn:microsoft.com/office/officeart/2011/layout/TabList"/>
     <dgm:cxn modelId="{01393574-0C7D-4580-B867-B93CADED6C7E}" type="presParOf" srcId="{63CF07DF-294E-4215-9B6C-5C3BCCC45688}" destId="{F82F5449-D542-4810-B467-43A5C2614DD5}" srcOrd="0" destOrd="0" presId="urn:microsoft.com/office/officeart/2011/layout/TabList"/>
     <dgm:cxn modelId="{2A2C2DA9-9F74-4E94-9167-80C01FF3DC10}" type="presParOf" srcId="{63CF07DF-294E-4215-9B6C-5C3BCCC45688}" destId="{B06197F1-B041-4747-A702-99E72A52C66D}" srcOrd="1" destOrd="0" presId="urn:microsoft.com/office/officeart/2011/layout/TabList"/>
@@ -4502,7 +4474,11 @@
           </a:pPr>
           <a:r>
             <a:rPr lang="en-US" sz="1100" kern="1200" dirty="0" smtClean="0"/>
-            <a:t>Small business advocacy organizations</a:t>
+            <a:t>Leaders of small </a:t>
+          </a:r>
+          <a:r>
+            <a:rPr lang="en-US" sz="1100" kern="1200" dirty="0" smtClean="0"/>
+            <a:t>business advocacy organizations</a:t>
           </a:r>
           <a:endParaRPr lang="en-US" sz="1100" kern="1200" dirty="0"/>
         </a:p>
@@ -5216,35 +5192,7 @@
           </a:pPr>
           <a:r>
             <a:rPr lang="en-US" sz="1100" b="1" kern="1200" dirty="0" smtClean="0"/>
-            <a:t>This policy changes the selection </a:t>
-          </a:r>
-          <a:r>
-            <a:rPr lang="en-US" sz="1100" b="1" kern="1200" dirty="0" smtClean="0"/>
-            <a:t>criteria </a:t>
-          </a:r>
-          <a:r>
-            <a:rPr lang="en-US" sz="1100" b="1" kern="1200" dirty="0" smtClean="0"/>
-            <a:t>from </a:t>
-          </a:r>
-          <a:r>
-            <a:rPr lang="en-US" sz="1100" b="1" kern="1200" dirty="0" smtClean="0"/>
-            <a:t> </a:t>
-          </a:r>
-          <a:r>
-            <a:rPr lang="en-US" sz="1100" b="1" kern="1200" dirty="0" smtClean="0"/>
-            <a:t>research </a:t>
-          </a:r>
-          <a:r>
-            <a:rPr lang="en-US" sz="1100" b="1" kern="1200" dirty="0" smtClean="0"/>
-            <a:t>excellence </a:t>
-          </a:r>
-          <a:r>
-            <a:rPr lang="en-US" sz="1100" b="1" kern="1200" dirty="0" smtClean="0"/>
-            <a:t>to a </a:t>
-          </a:r>
-          <a:r>
-            <a:rPr lang="en-US" sz="1100" b="1" kern="1200" dirty="0" smtClean="0"/>
-            <a:t>criteria of privilege.</a:t>
+            <a:t>This policy changes the selection criteria from  research excellence to a criteria of privilege.</a:t>
           </a:r>
           <a:endParaRPr lang="en-US" sz="1100" b="1" kern="1200" dirty="0"/>
         </a:p>
@@ -5750,11 +5698,7 @@
           </a:pPr>
           <a:r>
             <a:rPr lang="en-US" sz="1100" b="1" kern="1200" dirty="0" smtClean="0"/>
-            <a:t>This policy will unfairly take away opportunities from highly talented and deserving researchers </a:t>
-          </a:r>
-          <a:r>
-            <a:rPr lang="en-US" sz="1100" b="1" kern="1200" dirty="0" smtClean="0"/>
-            <a:t>.</a:t>
+            <a:t>This policy will unfairly take away opportunities from highly talented and deserving researchers .</a:t>
           </a:r>
           <a:endParaRPr lang="en-US" sz="1100" b="1" kern="1200" dirty="0"/>
         </a:p>
@@ -8792,7 +8736,7 @@
           <a:p>
             <a:fld id="{38350BF8-A4DA-458D-AEA8-6A7F2699BE48}" type="datetimeFigureOut">
               <a:rPr lang="en-US" smtClean="0"/>
-              <a:t>03/05/2019</a:t>
+              <a:t>3/5/2019</a:t>
             </a:fld>
             <a:endParaRPr lang="en-US"/>
           </a:p>
@@ -8962,7 +8906,7 @@
           <a:p>
             <a:fld id="{38350BF8-A4DA-458D-AEA8-6A7F2699BE48}" type="datetimeFigureOut">
               <a:rPr lang="en-US" smtClean="0"/>
-              <a:t>03/05/2019</a:t>
+              <a:t>3/5/2019</a:t>
             </a:fld>
             <a:endParaRPr lang="en-US"/>
           </a:p>
@@ -9142,7 +9086,7 @@
           <a:p>
             <a:fld id="{38350BF8-A4DA-458D-AEA8-6A7F2699BE48}" type="datetimeFigureOut">
               <a:rPr lang="en-US" smtClean="0"/>
-              <a:t>03/05/2019</a:t>
+              <a:t>3/5/2019</a:t>
             </a:fld>
             <a:endParaRPr lang="en-US"/>
           </a:p>
@@ -9312,7 +9256,7 @@
           <a:p>
             <a:fld id="{38350BF8-A4DA-458D-AEA8-6A7F2699BE48}" type="datetimeFigureOut">
               <a:rPr lang="en-US" smtClean="0"/>
-              <a:t>03/05/2019</a:t>
+              <a:t>3/5/2019</a:t>
             </a:fld>
             <a:endParaRPr lang="en-US"/>
           </a:p>
@@ -9558,7 +9502,7 @@
           <a:p>
             <a:fld id="{38350BF8-A4DA-458D-AEA8-6A7F2699BE48}" type="datetimeFigureOut">
               <a:rPr lang="en-US" smtClean="0"/>
-              <a:t>03/05/2019</a:t>
+              <a:t>3/5/2019</a:t>
             </a:fld>
             <a:endParaRPr lang="en-US"/>
           </a:p>
@@ -9846,7 +9790,7 @@
           <a:p>
             <a:fld id="{38350BF8-A4DA-458D-AEA8-6A7F2699BE48}" type="datetimeFigureOut">
               <a:rPr lang="en-US" smtClean="0"/>
-              <a:t>03/05/2019</a:t>
+              <a:t>3/5/2019</a:t>
             </a:fld>
             <a:endParaRPr lang="en-US"/>
           </a:p>
@@ -10268,7 +10212,7 @@
           <a:p>
             <a:fld id="{38350BF8-A4DA-458D-AEA8-6A7F2699BE48}" type="datetimeFigureOut">
               <a:rPr lang="en-US" smtClean="0"/>
-              <a:t>03/05/2019</a:t>
+              <a:t>3/5/2019</a:t>
             </a:fld>
             <a:endParaRPr lang="en-US"/>
           </a:p>
@@ -10386,7 +10330,7 @@
           <a:p>
             <a:fld id="{38350BF8-A4DA-458D-AEA8-6A7F2699BE48}" type="datetimeFigureOut">
               <a:rPr lang="en-US" smtClean="0"/>
-              <a:t>03/05/2019</a:t>
+              <a:t>3/5/2019</a:t>
             </a:fld>
             <a:endParaRPr lang="en-US"/>
           </a:p>
@@ -10481,7 +10425,7 @@
           <a:p>
             <a:fld id="{38350BF8-A4DA-458D-AEA8-6A7F2699BE48}" type="datetimeFigureOut">
               <a:rPr lang="en-US" smtClean="0"/>
-              <a:t>03/05/2019</a:t>
+              <a:t>3/5/2019</a:t>
             </a:fld>
             <a:endParaRPr lang="en-US"/>
           </a:p>
@@ -10758,7 +10702,7 @@
           <a:p>
             <a:fld id="{38350BF8-A4DA-458D-AEA8-6A7F2699BE48}" type="datetimeFigureOut">
               <a:rPr lang="en-US" smtClean="0"/>
-              <a:t>03/05/2019</a:t>
+              <a:t>3/5/2019</a:t>
             </a:fld>
             <a:endParaRPr lang="en-US"/>
           </a:p>
@@ -11011,7 +10955,7 @@
           <a:p>
             <a:fld id="{38350BF8-A4DA-458D-AEA8-6A7F2699BE48}" type="datetimeFigureOut">
               <a:rPr lang="en-US" smtClean="0"/>
-              <a:t>03/05/2019</a:t>
+              <a:t>3/5/2019</a:t>
             </a:fld>
             <a:endParaRPr lang="en-US"/>
           </a:p>
@@ -11224,7 +11168,7 @@
           <a:p>
             <a:fld id="{38350BF8-A4DA-458D-AEA8-6A7F2699BE48}" type="datetimeFigureOut">
               <a:rPr lang="en-US" smtClean="0"/>
-              <a:t>03/05/2019</a:t>
+              <a:t>3/5/2019</a:t>
             </a:fld>
             <a:endParaRPr lang="en-US"/>
           </a:p>
@@ -11658,11 +11602,7 @@
             <a:pPr algn="ctr"/>
             <a:r>
               <a:rPr lang="en-US" dirty="0" smtClean="0"/>
-              <a:t>Policy </a:t>
-            </a:r>
-            <a:r>
-              <a:rPr lang="en-US" dirty="0" smtClean="0"/>
-              <a:t>Summary</a:t>
+              <a:t>Policy Summary</a:t>
             </a:r>
             <a:endParaRPr lang="en-US" dirty="0"/>
           </a:p>
@@ -12273,11 +12213,7 @@
             <a:pPr algn="ctr"/>
             <a:r>
               <a:rPr lang="en-US" sz="1400" dirty="0" smtClean="0"/>
-              <a:t>U.S. </a:t>
-            </a:r>
-            <a:r>
-              <a:rPr lang="en-US" sz="1400" dirty="0" smtClean="0"/>
-              <a:t>Senate</a:t>
+              <a:t>U.S. Senate</a:t>
             </a:r>
             <a:endParaRPr lang="en-US" sz="1400" dirty="0"/>
           </a:p>
@@ -12323,11 +12259,7 @@
             <a:pPr algn="ctr"/>
             <a:r>
               <a:rPr lang="en-US" sz="1400" dirty="0" smtClean="0"/>
-              <a:t>U.S. House </a:t>
-            </a:r>
-            <a:r>
-              <a:rPr lang="en-US" sz="1400" dirty="0" smtClean="0"/>
-              <a:t>of Representatives</a:t>
+              <a:t>U.S. House of Representatives</a:t>
             </a:r>
             <a:endParaRPr lang="en-US" sz="1400" dirty="0"/>
           </a:p>
@@ -12373,19 +12305,7 @@
             <a:pPr algn="ctr"/>
             <a:r>
               <a:rPr lang="en-US" sz="1200" dirty="0" smtClean="0"/>
-              <a:t>Senate </a:t>
-            </a:r>
-            <a:r>
-              <a:rPr lang="en-US" sz="1200" dirty="0" smtClean="0"/>
-              <a:t>Subcommittee </a:t>
-            </a:r>
-            <a:r>
-              <a:rPr lang="en-US" sz="1200" dirty="0" smtClean="0"/>
-              <a:t>on </a:t>
-            </a:r>
-            <a:r>
-              <a:rPr lang="en-US" sz="1200" dirty="0" smtClean="0"/>
-              <a:t>Innovation &amp; Technology</a:t>
+              <a:t>Senate Subcommittee on Innovation &amp; Technology</a:t>
             </a:r>
             <a:endParaRPr lang="en-US" sz="1200" dirty="0"/>
           </a:p>
@@ -12429,11 +12349,11 @@
             <a:pPr algn="ctr"/>
             <a:r>
               <a:rPr lang="en-US" sz="1400" dirty="0" smtClean="0"/>
-              <a:t>Owners of </a:t>
+              <a:t>Owners of small </a:t>
             </a:r>
             <a:r>
               <a:rPr lang="en-US" sz="1400" dirty="0" smtClean="0"/>
-              <a:t>small Businesses</a:t>
+              <a:t>businesses</a:t>
             </a:r>
             <a:endParaRPr lang="en-US" sz="1400" dirty="0"/>
           </a:p>
@@ -12477,7 +12397,15 @@
             <a:pPr algn="ctr"/>
             <a:r>
               <a:rPr lang="en-US" sz="1400" dirty="0" smtClean="0"/>
-              <a:t>Leaders of research universities</a:t>
+              <a:t>Leaders </a:t>
+            </a:r>
+            <a:r>
+              <a:rPr lang="en-US" sz="1400" dirty="0" smtClean="0"/>
+              <a:t>and faculty of </a:t>
+            </a:r>
+            <a:r>
+              <a:rPr lang="en-US" sz="1400" dirty="0" smtClean="0"/>
+              <a:t>research universities</a:t>
             </a:r>
             <a:endParaRPr lang="en-US" sz="1400" dirty="0"/>
           </a:p>
@@ -12521,11 +12449,7 @@
             <a:pPr algn="ctr"/>
             <a:r>
               <a:rPr lang="en-US" sz="1400" dirty="0" smtClean="0"/>
-              <a:t>Executives of large </a:t>
-            </a:r>
-            <a:r>
-              <a:rPr lang="en-US" sz="1400" dirty="0" smtClean="0"/>
-              <a:t>businesses</a:t>
+              <a:t>Executives of large businesses</a:t>
             </a:r>
             <a:endParaRPr lang="en-US" sz="1400" dirty="0"/>
           </a:p>
@@ -12964,11 +12888,7 @@
             <a:pPr algn="ctr"/>
             <a:r>
               <a:rPr lang="en-US" sz="1400" dirty="0" smtClean="0"/>
-              <a:t>Leaders of small </a:t>
-            </a:r>
-            <a:r>
-              <a:rPr lang="en-US" sz="1400" dirty="0" smtClean="0"/>
-              <a:t>business advocacy organizations</a:t>
+              <a:t>Leaders of small business advocacy organizations</a:t>
             </a:r>
             <a:endParaRPr lang="en-US" sz="1400" dirty="0"/>
           </a:p>
@@ -13678,7 +13598,7 @@
           <p:nvPr>
             <p:extLst>
               <p:ext uri="{D42A27DB-BD31-4B8C-83A1-F6EECF244321}">
-                <p14:modId xmlns:p14="http://schemas.microsoft.com/office/powerpoint/2010/main" val="3873513919"/>
+                <p14:modId xmlns:p14="http://schemas.microsoft.com/office/powerpoint/2010/main" val="1911662279"/>
               </p:ext>
             </p:extLst>
           </p:nvPr>
@@ -13811,11 +13731,7 @@
             <a:pPr algn="ctr"/>
             <a:r>
               <a:rPr lang="en-US" dirty="0" smtClean="0"/>
-              <a:t>Policy and Political Implications Flow </a:t>
-            </a:r>
-            <a:r>
-              <a:rPr lang="en-US" dirty="0" smtClean="0"/>
-              <a:t>Diagram</a:t>
+              <a:t>Policy and Political Implications Flow Diagram</a:t>
             </a:r>
             <a:endParaRPr lang="en-US" dirty="0"/>
           </a:p>
@@ -13873,15 +13789,7 @@
               <a:pPr algn="ctr"/>
               <a:r>
                 <a:rPr lang="en-US" sz="1200" dirty="0" smtClean="0"/>
-                <a:t>Talented researchers </a:t>
-              </a:r>
-              <a:r>
-                <a:rPr lang="en-US" sz="1200" dirty="0" smtClean="0"/>
-                <a:t>should not be denied </a:t>
-              </a:r>
-              <a:r>
-                <a:rPr lang="en-US" sz="1200" dirty="0" smtClean="0"/>
-                <a:t>opportunities.</a:t>
+                <a:t>Talented researchers should not be denied opportunities.</a:t>
               </a:r>
               <a:endParaRPr lang="en-US" sz="1200" dirty="0"/>
             </a:p>
@@ -13984,19 +13892,7 @@
               <a:pPr algn="ctr"/>
               <a:r>
                 <a:rPr lang="en-US" sz="1200" dirty="0" smtClean="0"/>
-                <a:t>This policy will punish talented researchers </a:t>
-              </a:r>
-              <a:r>
-                <a:rPr lang="en-US" sz="1200" dirty="0" smtClean="0"/>
-                <a:t>at larger institutions </a:t>
-              </a:r>
-              <a:r>
-                <a:rPr lang="en-US" sz="1200" dirty="0" smtClean="0"/>
-                <a:t>simply </a:t>
-              </a:r>
-              <a:r>
-                <a:rPr lang="en-US" sz="1200" dirty="0" smtClean="0"/>
-                <a:t>because of where they work.</a:t>
+                <a:t>This policy will punish talented researchers at larger institutions simply because of where they work.</a:t>
               </a:r>
               <a:endParaRPr lang="en-US" sz="1200" dirty="0"/>
             </a:p>
@@ -14406,23 +14302,7 @@
               <a:pPr algn="ctr"/>
               <a:r>
                 <a:rPr lang="en-US" sz="1200" dirty="0" smtClean="0"/>
-                <a:t>This policy will allow small </a:t>
-              </a:r>
-              <a:r>
-                <a:rPr lang="en-US" sz="1200" dirty="0" smtClean="0"/>
-                <a:t>businesses a </a:t>
-              </a:r>
-              <a:r>
-                <a:rPr lang="en-US" sz="1200" dirty="0" smtClean="0"/>
-                <a:t>fair chance to contribute </a:t>
-              </a:r>
-              <a:r>
-                <a:rPr lang="en-US" sz="1200" dirty="0" smtClean="0"/>
-                <a:t>significant innovations to </a:t>
-              </a:r>
-              <a:r>
-                <a:rPr lang="en-US" sz="1200" dirty="0" smtClean="0"/>
-                <a:t>benefit the nation.</a:t>
+                <a:t>This policy will allow small businesses a fair chance to contribute significant innovations to benefit the nation.</a:t>
               </a:r>
               <a:endParaRPr lang="en-US" sz="1200" dirty="0"/>
             </a:p>
@@ -14927,7 +14807,19 @@
               <a:pPr algn="ctr"/>
               <a:r>
                 <a:rPr lang="en-US" sz="1200" dirty="0" smtClean="0"/>
-                <a:t>This policy stops and reverses the current trends of economic loss and lack of innovation.</a:t>
+                <a:t>This policy stops and reverses the current trends of economic </a:t>
+              </a:r>
+              <a:r>
+                <a:rPr lang="en-US" sz="1200" dirty="0" smtClean="0"/>
+                <a:t>recession</a:t>
+              </a:r>
+              <a:r>
+                <a:rPr lang="en-US" sz="1200" dirty="0" smtClean="0"/>
+                <a:t> </a:t>
+              </a:r>
+              <a:r>
+                <a:rPr lang="en-US" sz="1200" dirty="0" smtClean="0"/>
+                <a:t>and lack of innovation.</a:t>
               </a:r>
               <a:endParaRPr lang="en-US" sz="1200" dirty="0"/>
             </a:p>
@@ -15108,11 +15000,7 @@
             <a:pPr algn="ctr"/>
             <a:r>
               <a:rPr lang="en-US" dirty="0" smtClean="0"/>
-              <a:t>Policy and Political Implications Flow </a:t>
-            </a:r>
-            <a:r>
-              <a:rPr lang="en-US" dirty="0" smtClean="0"/>
-              <a:t>Diagram (cont’d)</a:t>
+              <a:t>Policy and Political Implications Flow Diagram (cont’d)</a:t>
             </a:r>
             <a:endParaRPr lang="en-US" dirty="0"/>
           </a:p>
@@ -15265,11 +15153,7 @@
               <a:pPr algn="ctr"/>
               <a:r>
                 <a:rPr lang="en-US" sz="1200" dirty="0" smtClean="0"/>
-                <a:t>America is </a:t>
-              </a:r>
-              <a:r>
-                <a:rPr lang="en-US" sz="1200" dirty="0" smtClean="0"/>
-                <a:t>guided by principles of fairness.</a:t>
+                <a:t>America is guided by principles of fairness.</a:t>
               </a:r>
               <a:endParaRPr lang="en-US" sz="1200" dirty="0"/>
             </a:p>
@@ -15893,11 +15777,7 @@
               <a:pPr algn="ctr"/>
               <a:r>
                 <a:rPr lang="en-US" sz="1200" dirty="0" smtClean="0"/>
-                <a:t>American research and development is the envy of the world</a:t>
-              </a:r>
-              <a:r>
-                <a:rPr lang="en-US" sz="1200" dirty="0" smtClean="0"/>
-                <a:t>.</a:t>
+                <a:t>American research and development is the envy of the world.</a:t>
               </a:r>
               <a:endParaRPr lang="en-US" sz="1200" dirty="0"/>
             </a:p>
@@ -16226,11 +16106,7 @@
               </a:r>
               <a:r>
                 <a:rPr lang="en-US" sz="1200" dirty="0" smtClean="0"/>
-                <a:t>no longer has a strong </a:t>
-              </a:r>
-              <a:r>
-                <a:rPr lang="en-US" sz="1200" dirty="0" smtClean="0"/>
-                <a:t>economy.</a:t>
+                <a:t>no longer has a strong economy.</a:t>
               </a:r>
               <a:endParaRPr lang="en-US" sz="1200" dirty="0"/>
             </a:p>
@@ -16502,11 +16378,7 @@
               </a:r>
               <a:r>
                 <a:rPr lang="en-US" sz="1200" dirty="0" smtClean="0"/>
-                <a:t>no longer has unquestioned global dominance</a:t>
-              </a:r>
-              <a:r>
-                <a:rPr lang="en-US" sz="1200" dirty="0" smtClean="0"/>
-                <a:t>.</a:t>
+                <a:t>no longer has unquestioned global dominance.</a:t>
               </a:r>
               <a:endParaRPr lang="en-US" sz="1200" dirty="0"/>
             </a:p>

</xml_diff>